<commit_message>
Editing of the presentation .ppt file.
</commit_message>
<xml_diff>
--- a/Documentation/Internal Plagiarism Detector.pptx
+++ b/Documentation/Internal Plagiarism Detector.pptx
@@ -7,14 +7,17 @@
   <p:sldIdLst>
     <p:sldId id="256" r:id="rId2"/>
     <p:sldId id="257" r:id="rId3"/>
-    <p:sldId id="258" r:id="rId4"/>
-    <p:sldId id="259" r:id="rId5"/>
-    <p:sldId id="260" r:id="rId6"/>
-    <p:sldId id="261" r:id="rId7"/>
-    <p:sldId id="262" r:id="rId8"/>
-    <p:sldId id="263" r:id="rId9"/>
-    <p:sldId id="264" r:id="rId10"/>
-    <p:sldId id="265" r:id="rId11"/>
+    <p:sldId id="266" r:id="rId4"/>
+    <p:sldId id="258" r:id="rId5"/>
+    <p:sldId id="259" r:id="rId6"/>
+    <p:sldId id="260" r:id="rId7"/>
+    <p:sldId id="261" r:id="rId8"/>
+    <p:sldId id="262" r:id="rId9"/>
+    <p:sldId id="263" r:id="rId10"/>
+    <p:sldId id="264" r:id="rId11"/>
+    <p:sldId id="265" r:id="rId12"/>
+    <p:sldId id="267" r:id="rId13"/>
+    <p:sldId id="268" r:id="rId14"/>
   </p:sldIdLst>
   <p:sldSz cx="12192000" cy="6858000"/>
   <p:notesSz cx="6858000" cy="9144000"/>
@@ -268,7 +271,7 @@
           <a:p>
             <a:fld id="{E05FB447-348F-4EBD-B1FD-00EE560F0DE4}" type="datetimeFigureOut">
               <a:rPr lang="en-US" smtClean="0"/>
-              <a:t>4/22/2025</a:t>
+              <a:t>4/25/2025</a:t>
             </a:fld>
             <a:endParaRPr lang="en-US"/>
           </a:p>
@@ -466,7 +469,7 @@
           <a:p>
             <a:fld id="{E05FB447-348F-4EBD-B1FD-00EE560F0DE4}" type="datetimeFigureOut">
               <a:rPr lang="en-US" smtClean="0"/>
-              <a:t>4/22/2025</a:t>
+              <a:t>4/25/2025</a:t>
             </a:fld>
             <a:endParaRPr lang="en-US"/>
           </a:p>
@@ -674,7 +677,7 @@
           <a:p>
             <a:fld id="{E05FB447-348F-4EBD-B1FD-00EE560F0DE4}" type="datetimeFigureOut">
               <a:rPr lang="en-US" smtClean="0"/>
-              <a:t>4/22/2025</a:t>
+              <a:t>4/25/2025</a:t>
             </a:fld>
             <a:endParaRPr lang="en-US"/>
           </a:p>
@@ -872,7 +875,7 @@
           <a:p>
             <a:fld id="{E05FB447-348F-4EBD-B1FD-00EE560F0DE4}" type="datetimeFigureOut">
               <a:rPr lang="en-US" smtClean="0"/>
-              <a:t>4/22/2025</a:t>
+              <a:t>4/25/2025</a:t>
             </a:fld>
             <a:endParaRPr lang="en-US"/>
           </a:p>
@@ -1147,7 +1150,7 @@
           <a:p>
             <a:fld id="{E05FB447-348F-4EBD-B1FD-00EE560F0DE4}" type="datetimeFigureOut">
               <a:rPr lang="en-US" smtClean="0"/>
-              <a:t>4/22/2025</a:t>
+              <a:t>4/25/2025</a:t>
             </a:fld>
             <a:endParaRPr lang="en-US"/>
           </a:p>
@@ -1412,7 +1415,7 @@
           <a:p>
             <a:fld id="{E05FB447-348F-4EBD-B1FD-00EE560F0DE4}" type="datetimeFigureOut">
               <a:rPr lang="en-US" smtClean="0"/>
-              <a:t>4/22/2025</a:t>
+              <a:t>4/25/2025</a:t>
             </a:fld>
             <a:endParaRPr lang="en-US"/>
           </a:p>
@@ -1824,7 +1827,7 @@
           <a:p>
             <a:fld id="{E05FB447-348F-4EBD-B1FD-00EE560F0DE4}" type="datetimeFigureOut">
               <a:rPr lang="en-US" smtClean="0"/>
-              <a:t>4/22/2025</a:t>
+              <a:t>4/25/2025</a:t>
             </a:fld>
             <a:endParaRPr lang="en-US"/>
           </a:p>
@@ -1965,7 +1968,7 @@
           <a:p>
             <a:fld id="{E05FB447-348F-4EBD-B1FD-00EE560F0DE4}" type="datetimeFigureOut">
               <a:rPr lang="en-US" smtClean="0"/>
-              <a:t>4/22/2025</a:t>
+              <a:t>4/25/2025</a:t>
             </a:fld>
             <a:endParaRPr lang="en-US"/>
           </a:p>
@@ -2078,7 +2081,7 @@
           <a:p>
             <a:fld id="{E05FB447-348F-4EBD-B1FD-00EE560F0DE4}" type="datetimeFigureOut">
               <a:rPr lang="en-US" smtClean="0"/>
-              <a:t>4/22/2025</a:t>
+              <a:t>4/25/2025</a:t>
             </a:fld>
             <a:endParaRPr lang="en-US"/>
           </a:p>
@@ -2389,7 +2392,7 @@
           <a:p>
             <a:fld id="{E05FB447-348F-4EBD-B1FD-00EE560F0DE4}" type="datetimeFigureOut">
               <a:rPr lang="en-US" smtClean="0"/>
-              <a:t>4/22/2025</a:t>
+              <a:t>4/25/2025</a:t>
             </a:fld>
             <a:endParaRPr lang="en-US"/>
           </a:p>
@@ -2677,7 +2680,7 @@
           <a:p>
             <a:fld id="{E05FB447-348F-4EBD-B1FD-00EE560F0DE4}" type="datetimeFigureOut">
               <a:rPr lang="en-US" smtClean="0"/>
-              <a:t>4/22/2025</a:t>
+              <a:t>4/25/2025</a:t>
             </a:fld>
             <a:endParaRPr lang="en-US"/>
           </a:p>
@@ -2918,7 +2921,7 @@
           <a:p>
             <a:fld id="{E05FB447-348F-4EBD-B1FD-00EE560F0DE4}" type="datetimeFigureOut">
               <a:rPr lang="en-US" smtClean="0"/>
-              <a:t>4/22/2025</a:t>
+              <a:t>4/25/2025</a:t>
             </a:fld>
             <a:endParaRPr lang="en-US"/>
           </a:p>
@@ -3384,7 +3387,7 @@
         <p:spPr/>
         <p:txBody>
           <a:bodyPr>
-            <a:normAutofit/>
+            <a:normAutofit fontScale="92500" lnSpcReduction="20000"/>
           </a:bodyPr>
           <a:lstStyle/>
           <a:p>
@@ -3397,6 +3400,12 @@
             <a:r>
               <a:rPr lang="en-US" sz="4000" b="1" dirty="0"/>
               <a:t>SB06/JR/MN/14072/2022</a:t>
+            </a:r>
+          </a:p>
+          <a:p>
+            <a:r>
+              <a:rPr lang="en-US" sz="4000" b="1" dirty="0"/>
+              <a:t>Supervisor: Dr Okemwa</a:t>
             </a:r>
           </a:p>
         </p:txBody>
@@ -3415,6 +3424,96 @@
 </file>
 
 <file path=ppt/slides/slide10.xml><?xml version="1.0" encoding="utf-8"?>
+<p:sld xmlns:a="http://schemas.openxmlformats.org/drawingml/2006/main" xmlns:r="http://schemas.openxmlformats.org/officeDocument/2006/relationships" xmlns:p="http://schemas.openxmlformats.org/presentationml/2006/main">
+  <p:cSld>
+    <p:spTree>
+      <p:nvGrpSpPr>
+        <p:cNvPr id="1" name=""/>
+        <p:cNvGrpSpPr/>
+        <p:nvPr/>
+      </p:nvGrpSpPr>
+      <p:grpSpPr>
+        <a:xfrm>
+          <a:off x="0" y="0"/>
+          <a:ext cx="0" cy="0"/>
+          <a:chOff x="0" y="0"/>
+          <a:chExt cx="0" cy="0"/>
+        </a:xfrm>
+      </p:grpSpPr>
+      <p:sp>
+        <p:nvSpPr>
+          <p:cNvPr id="2" name="Title 1">
+            <a:extLst>
+              <a:ext uri="{FF2B5EF4-FFF2-40B4-BE49-F238E27FC236}">
+                <a16:creationId xmlns:a16="http://schemas.microsoft.com/office/drawing/2014/main" id="{C7929935-7FC9-CEA3-806F-9AF5B32D42B2}"/>
+              </a:ext>
+            </a:extLst>
+          </p:cNvPr>
+          <p:cNvSpPr>
+            <a:spLocks noGrp="1"/>
+          </p:cNvSpPr>
+          <p:nvPr>
+            <p:ph type="title"/>
+          </p:nvPr>
+        </p:nvSpPr>
+        <p:spPr/>
+        <p:txBody>
+          <a:bodyPr/>
+          <a:lstStyle/>
+          <a:p>
+            <a:endParaRPr lang="en-US"/>
+          </a:p>
+        </p:txBody>
+      </p:sp>
+      <p:pic>
+        <p:nvPicPr>
+          <p:cNvPr id="5" name="Content Placeholder 4" descr="A screenshot of a computer&#10;&#10;AI-generated content may be incorrect.">
+            <a:extLst>
+              <a:ext uri="{FF2B5EF4-FFF2-40B4-BE49-F238E27FC236}">
+                <a16:creationId xmlns:a16="http://schemas.microsoft.com/office/drawing/2014/main" id="{47C287C9-C4A1-58C9-5670-C39AF0CECB03}"/>
+              </a:ext>
+            </a:extLst>
+          </p:cNvPr>
+          <p:cNvPicPr>
+            <a:picLocks noGrp="1" noChangeAspect="1"/>
+          </p:cNvPicPr>
+          <p:nvPr>
+            <p:ph idx="1"/>
+          </p:nvPr>
+        </p:nvPicPr>
+        <p:blipFill>
+          <a:blip r:embed="rId2">
+            <a:extLst>
+              <a:ext uri="{28A0092B-C50C-407E-A947-70E740481C1C}">
+                <a14:useLocalDpi xmlns:a14="http://schemas.microsoft.com/office/drawing/2010/main" val="0"/>
+              </a:ext>
+            </a:extLst>
+          </a:blip>
+          <a:stretch>
+            <a:fillRect/>
+          </a:stretch>
+        </p:blipFill>
+        <p:spPr>
+          <a:xfrm>
+            <a:off x="0" y="0"/>
+            <a:ext cx="12192000" cy="6858000"/>
+          </a:xfrm>
+        </p:spPr>
+      </p:pic>
+    </p:spTree>
+    <p:extLst>
+      <p:ext uri="{BB962C8B-B14F-4D97-AF65-F5344CB8AC3E}">
+        <p14:creationId xmlns:p14="http://schemas.microsoft.com/office/powerpoint/2010/main" val="3843908412"/>
+      </p:ext>
+    </p:extLst>
+  </p:cSld>
+  <p:clrMapOvr>
+    <a:masterClrMapping/>
+  </p:clrMapOvr>
+</p:sld>
+</file>
+
+<file path=ppt/slides/slide11.xml><?xml version="1.0" encoding="utf-8"?>
 <p:sld xmlns:a="http://schemas.openxmlformats.org/drawingml/2006/main" xmlns:r="http://schemas.openxmlformats.org/officeDocument/2006/relationships" xmlns:p="http://schemas.openxmlformats.org/presentationml/2006/main">
   <p:cSld>
     <p:bg>
@@ -3503,6 +3602,256 @@
     <p:extLst>
       <p:ext uri="{BB962C8B-B14F-4D97-AF65-F5344CB8AC3E}">
         <p14:creationId xmlns:p14="http://schemas.microsoft.com/office/powerpoint/2010/main" val="528928000"/>
+      </p:ext>
+    </p:extLst>
+  </p:cSld>
+  <p:clrMapOvr>
+    <a:masterClrMapping/>
+  </p:clrMapOvr>
+</p:sld>
+</file>
+
+<file path=ppt/slides/slide12.xml><?xml version="1.0" encoding="utf-8"?>
+<p:sld xmlns:a="http://schemas.openxmlformats.org/drawingml/2006/main" xmlns:r="http://schemas.openxmlformats.org/officeDocument/2006/relationships" xmlns:p="http://schemas.openxmlformats.org/presentationml/2006/main">
+  <p:cSld>
+    <p:spTree>
+      <p:nvGrpSpPr>
+        <p:cNvPr id="1" name=""/>
+        <p:cNvGrpSpPr/>
+        <p:nvPr/>
+      </p:nvGrpSpPr>
+      <p:grpSpPr>
+        <a:xfrm>
+          <a:off x="0" y="0"/>
+          <a:ext cx="0" cy="0"/>
+          <a:chOff x="0" y="0"/>
+          <a:chExt cx="0" cy="0"/>
+        </a:xfrm>
+      </p:grpSpPr>
+      <p:sp>
+        <p:nvSpPr>
+          <p:cNvPr id="2" name="Title 1">
+            <a:extLst>
+              <a:ext uri="{FF2B5EF4-FFF2-40B4-BE49-F238E27FC236}">
+                <a16:creationId xmlns:a16="http://schemas.microsoft.com/office/drawing/2014/main" id="{D994BFC4-4BBC-FC83-B28C-59F9E3F20B06}"/>
+              </a:ext>
+            </a:extLst>
+          </p:cNvPr>
+          <p:cNvSpPr>
+            <a:spLocks noGrp="1"/>
+          </p:cNvSpPr>
+          <p:nvPr>
+            <p:ph type="title"/>
+          </p:nvPr>
+        </p:nvSpPr>
+        <p:spPr/>
+        <p:txBody>
+          <a:bodyPr>
+            <a:normAutofit/>
+          </a:bodyPr>
+          <a:lstStyle/>
+          <a:p>
+            <a:r>
+              <a:rPr lang="en-US" sz="4000" b="1" u="sng" dirty="0"/>
+              <a:t>Challenges and Limitations</a:t>
+            </a:r>
+          </a:p>
+        </p:txBody>
+      </p:sp>
+      <p:sp>
+        <p:nvSpPr>
+          <p:cNvPr id="3" name="Content Placeholder 2">
+            <a:extLst>
+              <a:ext uri="{FF2B5EF4-FFF2-40B4-BE49-F238E27FC236}">
+                <a16:creationId xmlns:a16="http://schemas.microsoft.com/office/drawing/2014/main" id="{D13B2924-A245-321A-952F-F95FFDA1CA72}"/>
+              </a:ext>
+            </a:extLst>
+          </p:cNvPr>
+          <p:cNvSpPr>
+            <a:spLocks noGrp="1"/>
+          </p:cNvSpPr>
+          <p:nvPr>
+            <p:ph idx="1"/>
+          </p:nvPr>
+        </p:nvSpPr>
+        <p:spPr/>
+        <p:txBody>
+          <a:bodyPr/>
+          <a:lstStyle/>
+          <a:p>
+            <a:pPr marL="0" indent="0">
+              <a:buNone/>
+            </a:pPr>
+            <a:r>
+              <a:rPr lang="en-US" dirty="0"/>
+              <a:t>Despite advancements, several challenges persist:</a:t>
+            </a:r>
+          </a:p>
+          <a:p>
+            <a:r>
+              <a:rPr lang="en-US" b="1" i="1" dirty="0"/>
+              <a:t>False Positives:</a:t>
+            </a:r>
+            <a:r>
+              <a:rPr lang="en-US" dirty="0"/>
+              <a:t> Common phrases or templates my trigger unnecessary plagiarism flags.</a:t>
+            </a:r>
+          </a:p>
+          <a:p>
+            <a:r>
+              <a:rPr lang="en-US" b="1" i="1" dirty="0"/>
+              <a:t>False Negatives:</a:t>
+            </a:r>
+            <a:r>
+              <a:rPr lang="en-US" dirty="0"/>
+              <a:t> Paraphrased content can evade detection.</a:t>
+            </a:r>
+          </a:p>
+          <a:p>
+            <a:r>
+              <a:rPr lang="en-US" b="1" i="1" dirty="0"/>
+              <a:t>Computational Intensity:</a:t>
+            </a:r>
+            <a:r>
+              <a:rPr lang="en-US" dirty="0"/>
+              <a:t> Advanced models require significant processing power.</a:t>
+            </a:r>
+          </a:p>
+        </p:txBody>
+      </p:sp>
+    </p:spTree>
+    <p:extLst>
+      <p:ext uri="{BB962C8B-B14F-4D97-AF65-F5344CB8AC3E}">
+        <p14:creationId xmlns:p14="http://schemas.microsoft.com/office/powerpoint/2010/main" val="3444944332"/>
+      </p:ext>
+    </p:extLst>
+  </p:cSld>
+  <p:clrMapOvr>
+    <a:masterClrMapping/>
+  </p:clrMapOvr>
+</p:sld>
+</file>
+
+<file path=ppt/slides/slide13.xml><?xml version="1.0" encoding="utf-8"?>
+<p:sld xmlns:a="http://schemas.openxmlformats.org/drawingml/2006/main" xmlns:r="http://schemas.openxmlformats.org/officeDocument/2006/relationships" xmlns:p="http://schemas.openxmlformats.org/presentationml/2006/main">
+  <p:cSld>
+    <p:spTree>
+      <p:nvGrpSpPr>
+        <p:cNvPr id="1" name=""/>
+        <p:cNvGrpSpPr/>
+        <p:nvPr/>
+      </p:nvGrpSpPr>
+      <p:grpSpPr>
+        <a:xfrm>
+          <a:off x="0" y="0"/>
+          <a:ext cx="0" cy="0"/>
+          <a:chOff x="0" y="0"/>
+          <a:chExt cx="0" cy="0"/>
+        </a:xfrm>
+      </p:grpSpPr>
+      <p:sp>
+        <p:nvSpPr>
+          <p:cNvPr id="2" name="Title 1">
+            <a:extLst>
+              <a:ext uri="{FF2B5EF4-FFF2-40B4-BE49-F238E27FC236}">
+                <a16:creationId xmlns:a16="http://schemas.microsoft.com/office/drawing/2014/main" id="{F1626F58-40BC-D3F1-81B1-92AD2CE7F4B5}"/>
+              </a:ext>
+            </a:extLst>
+          </p:cNvPr>
+          <p:cNvSpPr>
+            <a:spLocks noGrp="1"/>
+          </p:cNvSpPr>
+          <p:nvPr>
+            <p:ph type="title"/>
+          </p:nvPr>
+        </p:nvSpPr>
+        <p:spPr/>
+        <p:txBody>
+          <a:bodyPr>
+            <a:normAutofit/>
+          </a:bodyPr>
+          <a:lstStyle/>
+          <a:p>
+            <a:r>
+              <a:rPr lang="en-US" sz="4000" b="1" u="sng" dirty="0"/>
+              <a:t>Future Works</a:t>
+            </a:r>
+          </a:p>
+        </p:txBody>
+      </p:sp>
+      <p:sp>
+        <p:nvSpPr>
+          <p:cNvPr id="3" name="Content Placeholder 2">
+            <a:extLst>
+              <a:ext uri="{FF2B5EF4-FFF2-40B4-BE49-F238E27FC236}">
+                <a16:creationId xmlns:a16="http://schemas.microsoft.com/office/drawing/2014/main" id="{72B87778-B35E-1378-D4DB-EEF9B71294A9}"/>
+              </a:ext>
+            </a:extLst>
+          </p:cNvPr>
+          <p:cNvSpPr>
+            <a:spLocks noGrp="1"/>
+          </p:cNvSpPr>
+          <p:nvPr>
+            <p:ph idx="1"/>
+          </p:nvPr>
+        </p:nvSpPr>
+        <p:spPr/>
+        <p:txBody>
+          <a:bodyPr>
+            <a:normAutofit fontScale="92500"/>
+          </a:bodyPr>
+          <a:lstStyle/>
+          <a:p>
+            <a:pPr marL="0" indent="0">
+              <a:buNone/>
+            </a:pPr>
+            <a:r>
+              <a:rPr lang="en-US" b="1" i="1" dirty="0"/>
+              <a:t>Support for Multiple Languages. </a:t>
+            </a:r>
+          </a:p>
+          <a:p>
+            <a:r>
+              <a:rPr lang="en-US" dirty="0"/>
+              <a:t>Expanding the system to accommodate languages such as French, Chinese, and Spanish.</a:t>
+            </a:r>
+          </a:p>
+          <a:p>
+            <a:pPr marL="0" indent="0">
+              <a:buNone/>
+            </a:pPr>
+            <a:r>
+              <a:rPr lang="en-US" b="1" i="1" dirty="0"/>
+              <a:t>Plagiarism Detection in Code Submissions.</a:t>
+            </a:r>
+          </a:p>
+          <a:p>
+            <a:r>
+              <a:rPr lang="en-US" dirty="0"/>
+              <a:t>Expanding the tool to include programming assignments would address academic integrity concerns in computer science education.</a:t>
+            </a:r>
+          </a:p>
+          <a:p>
+            <a:pPr marL="0" indent="0">
+              <a:buNone/>
+            </a:pPr>
+            <a:r>
+              <a:rPr lang="en-US" b="1" i="1" dirty="0"/>
+              <a:t>Detection of AI-Generated Content.</a:t>
+            </a:r>
+          </a:p>
+          <a:p>
+            <a:r>
+              <a:rPr lang="en-US" dirty="0"/>
+              <a:t>Given the rapid rise of AI-assisted writing, developing classifiers capable of identifying machine-generated text with high precision is crucial.</a:t>
+            </a:r>
+          </a:p>
+        </p:txBody>
+      </p:sp>
+    </p:spTree>
+    <p:extLst>
+      <p:ext uri="{BB962C8B-B14F-4D97-AF65-F5344CB8AC3E}">
+        <p14:creationId xmlns:p14="http://schemas.microsoft.com/office/powerpoint/2010/main" val="4273240258"/>
       </p:ext>
     </p:extLst>
   </p:cSld>
@@ -3558,7 +3907,7 @@
           <a:lstStyle/>
           <a:p>
             <a:r>
-              <a:rPr lang="en-US" b="1" u="sng" dirty="0"/>
+              <a:rPr lang="en-US" sz="4000" b="1" u="sng" dirty="0"/>
               <a:t>PROBLEM STATEMENT</a:t>
             </a:r>
           </a:p>
@@ -3582,13 +3931,13 @@
         </p:nvSpPr>
         <p:spPr>
           <a:xfrm>
-            <a:off x="838200" y="876299"/>
+            <a:off x="838200" y="741388"/>
             <a:ext cx="10515600" cy="5839293"/>
           </a:xfrm>
         </p:spPr>
         <p:txBody>
           <a:bodyPr>
-            <a:normAutofit/>
+            <a:normAutofit lnSpcReduction="10000"/>
           </a:bodyPr>
           <a:lstStyle/>
           <a:p>
@@ -3615,26 +3964,40 @@
               <a:buNone/>
             </a:pPr>
             <a:r>
-              <a:rPr lang="en-US" sz="4000" b="1" i="1" u="sng" dirty="0"/>
-              <a:t>OBJECTIVES</a:t>
+              <a:rPr lang="en-US" sz="3200" b="1" i="1" u="sng" dirty="0"/>
+              <a:t>GENERAL OBJECTIVE</a:t>
             </a:r>
           </a:p>
           <a:p>
             <a:r>
               <a:rPr lang="en-US" dirty="0"/>
-              <a:t>To convert multiple file formats (e.g., `.docx`, `.pdf`, `.html`) to `.txt` for uniform processing. </a:t>
-            </a:r>
+              <a:t>To detect similarities via cosine similarity and provide detailed reports (CSV/PDF). </a:t>
+            </a:r>
+          </a:p>
+          <a:p>
+            <a:pPr marL="0" indent="0">
+              <a:buNone/>
+            </a:pPr>
+            <a:r>
+              <a:rPr lang="en-US" b="1" i="1" u="sng" dirty="0"/>
+              <a:t>SPECIFIC</a:t>
+            </a:r>
+            <a:r>
+              <a:rPr lang="en-US" sz="2800" b="1" i="1" u="sng" dirty="0"/>
+              <a:t> OBJECTIVES</a:t>
+            </a:r>
+            <a:endParaRPr lang="en-US" dirty="0"/>
           </a:p>
           <a:p>
             <a:r>
               <a:rPr lang="en-US" dirty="0"/>
-              <a:t>To generate semantic embeddings using transformer models (e.g., `all-MiniLM-L6-v2`). </a:t>
+              <a:t>To convert multiple file formats (e.g., ‘.docx’, ‘.pdf’, ‘.html’) to ‘.txt’ for uniform processing.</a:t>
             </a:r>
           </a:p>
           <a:p>
             <a:r>
               <a:rPr lang="en-US" dirty="0"/>
-              <a:t>To detect similarities via cosine similarity and provide detailed reports (CSV/PDF).</a:t>
+              <a:t>To generate semantic embeddings using transformer models (e.g., ‘all-MiniLM-L6-V2’).</a:t>
             </a:r>
           </a:p>
           <a:p>
@@ -3661,14 +4024,6 @@
 <file path=ppt/slides/slide3.xml><?xml version="1.0" encoding="utf-8"?>
 <p:sld xmlns:a="http://schemas.openxmlformats.org/drawingml/2006/main" xmlns:r="http://schemas.openxmlformats.org/officeDocument/2006/relationships" xmlns:p="http://schemas.openxmlformats.org/presentationml/2006/main">
   <p:cSld>
-    <p:bg>
-      <p:bgPr>
-        <a:solidFill>
-          <a:schemeClr val="tx1"/>
-        </a:solidFill>
-        <a:effectLst/>
-      </p:bgPr>
-    </p:bg>
     <p:spTree>
       <p:nvGrpSpPr>
         <p:cNvPr id="1" name=""/>
@@ -3688,7 +4043,7 @@
           <p:cNvPr id="2" name="Title 1">
             <a:extLst>
               <a:ext uri="{FF2B5EF4-FFF2-40B4-BE49-F238E27FC236}">
-                <a16:creationId xmlns:a16="http://schemas.microsoft.com/office/drawing/2014/main" id="{710D50BC-0DDD-B3FC-7B8F-3B43572B060D}"/>
+                <a16:creationId xmlns:a16="http://schemas.microsoft.com/office/drawing/2014/main" id="{7E4C0AB6-88A0-D99E-BEB7-83775C865A78}"/>
               </a:ext>
             </a:extLst>
           </p:cNvPr>
@@ -3699,61 +4054,109 @@
             <p:ph type="title"/>
           </p:nvPr>
         </p:nvSpPr>
-        <p:spPr>
-          <a:xfrm>
-            <a:off x="838200" y="119921"/>
-            <a:ext cx="10515600" cy="749509"/>
-          </a:xfrm>
-        </p:spPr>
+        <p:spPr/>
         <p:txBody>
           <a:bodyPr>
             <a:normAutofit/>
           </a:bodyPr>
           <a:lstStyle/>
           <a:p>
-            <a:endParaRPr lang="en-US" dirty="0"/>
-          </a:p>
-        </p:txBody>
-      </p:sp>
-      <p:pic>
-        <p:nvPicPr>
-          <p:cNvPr id="7" name="Content Placeholder 6" descr="A diagram of a process&#10;&#10;AI-generated content may be incorrect.">
-            <a:extLst>
-              <a:ext uri="{FF2B5EF4-FFF2-40B4-BE49-F238E27FC236}">
-                <a16:creationId xmlns:a16="http://schemas.microsoft.com/office/drawing/2014/main" id="{CE6358A2-7265-5703-F1BC-BBF2324465F0}"/>
-              </a:ext>
-            </a:extLst>
-          </p:cNvPr>
-          <p:cNvPicPr>
-            <a:picLocks noGrp="1" noChangeAspect="1"/>
-          </p:cNvPicPr>
+            <a:r>
+              <a:rPr lang="en-US" sz="4000" b="1" u="sng" dirty="0"/>
+              <a:t>JUSTIFICATION</a:t>
+            </a:r>
+          </a:p>
+        </p:txBody>
+      </p:sp>
+      <p:sp>
+        <p:nvSpPr>
+          <p:cNvPr id="3" name="Content Placeholder 2">
+            <a:extLst>
+              <a:ext uri="{FF2B5EF4-FFF2-40B4-BE49-F238E27FC236}">
+                <a16:creationId xmlns:a16="http://schemas.microsoft.com/office/drawing/2014/main" id="{0B62D1D6-BD3F-46AC-66BB-FD37144724E7}"/>
+              </a:ext>
+            </a:extLst>
+          </p:cNvPr>
+          <p:cNvSpPr>
+            <a:spLocks noGrp="1"/>
+          </p:cNvSpPr>
           <p:nvPr>
             <p:ph idx="1"/>
           </p:nvPr>
-        </p:nvPicPr>
-        <p:blipFill>
-          <a:blip r:embed="rId2">
-            <a:extLst>
-              <a:ext uri="{28A0092B-C50C-407E-A947-70E740481C1C}">
-                <a14:useLocalDpi xmlns:a14="http://schemas.microsoft.com/office/drawing/2010/main" val="0"/>
-              </a:ext>
-            </a:extLst>
-          </a:blip>
-          <a:stretch>
-            <a:fillRect/>
-          </a:stretch>
-        </p:blipFill>
+        </p:nvSpPr>
         <p:spPr>
           <a:xfrm>
-            <a:off x="0" y="-104930"/>
-            <a:ext cx="12192000" cy="6977920"/>
+            <a:off x="853190" y="1253331"/>
+            <a:ext cx="10515600" cy="4351338"/>
           </a:xfrm>
         </p:spPr>
-      </p:pic>
+        <p:txBody>
+          <a:bodyPr>
+            <a:noAutofit/>
+          </a:bodyPr>
+          <a:lstStyle/>
+          <a:p>
+            <a:pPr marL="0" indent="0">
+              <a:buNone/>
+            </a:pPr>
+            <a:r>
+              <a:rPr lang="en-US" kern="100" dirty="0">
+                <a:effectLst/>
+                <a:ea typeface="Calibri" panose="020F0502020204030204" pitchFamily="34" charset="0"/>
+                <a:cs typeface="Times New Roman" panose="02020603050405020304" pitchFamily="18" charset="0"/>
+              </a:rPr>
+              <a:t>The rise in digital submissions has increased the complexity of detecting plagiarism in assignments. Existing tools are insufficient for addressing internal plagiarism, especially in assignments submitted within a single cohort. This tool fills this gap by focusing solely on assignment submissions, enabling academic professionals to ensure fairness and maintain academic standards. </a:t>
+            </a:r>
+          </a:p>
+          <a:p>
+            <a:pPr marL="0" indent="0">
+              <a:buNone/>
+            </a:pPr>
+            <a:r>
+              <a:rPr lang="en-US" kern="100" dirty="0">
+                <a:effectLst/>
+                <a:ea typeface="Calibri" panose="020F0502020204030204" pitchFamily="34" charset="0"/>
+                <a:cs typeface="Times New Roman" panose="02020603050405020304" pitchFamily="18" charset="0"/>
+              </a:rPr>
+              <a:t>By automating the detection process and providing detailed similarity reports, the tool;</a:t>
+            </a:r>
+          </a:p>
+          <a:p>
+            <a:r>
+              <a:rPr lang="en-US" kern="100" dirty="0">
+                <a:effectLst/>
+                <a:ea typeface="Calibri" panose="020F0502020204030204" pitchFamily="34" charset="0"/>
+                <a:cs typeface="Times New Roman" panose="02020603050405020304" pitchFamily="18" charset="0"/>
+              </a:rPr>
+              <a:t>saves time, </a:t>
+            </a:r>
+          </a:p>
+          <a:p>
+            <a:r>
+              <a:rPr lang="en-US" kern="100" dirty="0">
+                <a:effectLst/>
+                <a:ea typeface="Calibri" panose="020F0502020204030204" pitchFamily="34" charset="0"/>
+                <a:cs typeface="Times New Roman" panose="02020603050405020304" pitchFamily="18" charset="0"/>
+              </a:rPr>
+              <a:t>reduces human error, </a:t>
+            </a:r>
+          </a:p>
+          <a:p>
+            <a:r>
+              <a:rPr lang="en-US" kern="100" dirty="0">
+                <a:effectLst/>
+                <a:ea typeface="Calibri" panose="020F0502020204030204" pitchFamily="34" charset="0"/>
+                <a:cs typeface="Times New Roman" panose="02020603050405020304" pitchFamily="18" charset="0"/>
+              </a:rPr>
+              <a:t>and supports academic professionals in identifying dishonest submissions more efficiently.</a:t>
+            </a:r>
+          </a:p>
+        </p:txBody>
+      </p:sp>
     </p:spTree>
     <p:extLst>
       <p:ext uri="{BB962C8B-B14F-4D97-AF65-F5344CB8AC3E}">
-        <p14:creationId xmlns:p14="http://schemas.microsoft.com/office/powerpoint/2010/main" val="1052126272"/>
+        <p14:creationId xmlns:p14="http://schemas.microsoft.com/office/powerpoint/2010/main" val="3175250368"/>
       </p:ext>
     </p:extLst>
   </p:cSld>
@@ -3793,7 +4196,7 @@
           <p:cNvPr id="2" name="Title 1">
             <a:extLst>
               <a:ext uri="{FF2B5EF4-FFF2-40B4-BE49-F238E27FC236}">
-                <a16:creationId xmlns:a16="http://schemas.microsoft.com/office/drawing/2014/main" id="{C3B8BA52-F2E9-BDCB-7D69-2E716C1F5A79}"/>
+                <a16:creationId xmlns:a16="http://schemas.microsoft.com/office/drawing/2014/main" id="{710D50BC-0DDD-B3FC-7B8F-3B43572B060D}"/>
               </a:ext>
             </a:extLst>
           </p:cNvPr>
@@ -3806,13 +4209,13 @@
         </p:nvSpPr>
         <p:spPr>
           <a:xfrm>
-            <a:off x="838200" y="45719"/>
-            <a:ext cx="10515600" cy="628838"/>
+            <a:off x="838200" y="119921"/>
+            <a:ext cx="10515600" cy="749509"/>
           </a:xfrm>
         </p:spPr>
         <p:txBody>
           <a:bodyPr>
-            <a:normAutofit fontScale="90000"/>
+            <a:normAutofit/>
           </a:bodyPr>
           <a:lstStyle/>
           <a:p>
@@ -3822,10 +4225,10 @@
       </p:sp>
       <p:pic>
         <p:nvPicPr>
-          <p:cNvPr id="5" name="Content Placeholder 4" descr="A diagram of a funnel&#10;&#10;AI-generated content may be incorrect.">
-            <a:extLst>
-              <a:ext uri="{FF2B5EF4-FFF2-40B4-BE49-F238E27FC236}">
-                <a16:creationId xmlns:a16="http://schemas.microsoft.com/office/drawing/2014/main" id="{B9FE8AAC-C8C7-CBA7-D650-2CC39B9C72D8}"/>
+          <p:cNvPr id="7" name="Content Placeholder 6" descr="A diagram of a process&#10;&#10;AI-generated content may be incorrect.">
+            <a:extLst>
+              <a:ext uri="{FF2B5EF4-FFF2-40B4-BE49-F238E27FC236}">
+                <a16:creationId xmlns:a16="http://schemas.microsoft.com/office/drawing/2014/main" id="{CE6358A2-7265-5703-F1BC-BBF2324465F0}"/>
               </a:ext>
             </a:extLst>
           </p:cNvPr>
@@ -3850,15 +4253,15 @@
         </p:blipFill>
         <p:spPr>
           <a:xfrm>
-            <a:off x="0" y="-404734"/>
-            <a:ext cx="12192000" cy="7217015"/>
+            <a:off x="0" y="-104930"/>
+            <a:ext cx="12192000" cy="6977920"/>
           </a:xfrm>
         </p:spPr>
       </p:pic>
     </p:spTree>
     <p:extLst>
       <p:ext uri="{BB962C8B-B14F-4D97-AF65-F5344CB8AC3E}">
-        <p14:creationId xmlns:p14="http://schemas.microsoft.com/office/powerpoint/2010/main" val="3073409952"/>
+        <p14:creationId xmlns:p14="http://schemas.microsoft.com/office/powerpoint/2010/main" val="1052126272"/>
       </p:ext>
     </p:extLst>
   </p:cSld>
@@ -3898,7 +4301,7 @@
           <p:cNvPr id="2" name="Title 1">
             <a:extLst>
               <a:ext uri="{FF2B5EF4-FFF2-40B4-BE49-F238E27FC236}">
-                <a16:creationId xmlns:a16="http://schemas.microsoft.com/office/drawing/2014/main" id="{AA2C6B31-03FE-3C20-C2CB-EBC0EE5C9BDB}"/>
+                <a16:creationId xmlns:a16="http://schemas.microsoft.com/office/drawing/2014/main" id="{C3B8BA52-F2E9-BDCB-7D69-2E716C1F5A79}"/>
               </a:ext>
             </a:extLst>
           </p:cNvPr>
@@ -3911,13 +4314,13 @@
         </p:nvSpPr>
         <p:spPr>
           <a:xfrm>
-            <a:off x="838200" y="104931"/>
-            <a:ext cx="10515600" cy="734517"/>
+            <a:off x="838200" y="45719"/>
+            <a:ext cx="10515600" cy="628838"/>
           </a:xfrm>
         </p:spPr>
         <p:txBody>
           <a:bodyPr>
-            <a:normAutofit/>
+            <a:normAutofit fontScale="90000"/>
           </a:bodyPr>
           <a:lstStyle/>
           <a:p>
@@ -3927,10 +4330,10 @@
       </p:sp>
       <p:pic>
         <p:nvPicPr>
-          <p:cNvPr id="5" name="Content Placeholder 4" descr="A diagram of a diagram&#10;&#10;AI-generated content may be incorrect.">
-            <a:extLst>
-              <a:ext uri="{FF2B5EF4-FFF2-40B4-BE49-F238E27FC236}">
-                <a16:creationId xmlns:a16="http://schemas.microsoft.com/office/drawing/2014/main" id="{E3F4AFEA-4E5E-C5D3-DE59-0B831E4EFC6E}"/>
+          <p:cNvPr id="5" name="Content Placeholder 4" descr="A diagram of a funnel&#10;&#10;AI-generated content may be incorrect.">
+            <a:extLst>
+              <a:ext uri="{FF2B5EF4-FFF2-40B4-BE49-F238E27FC236}">
+                <a16:creationId xmlns:a16="http://schemas.microsoft.com/office/drawing/2014/main" id="{B9FE8AAC-C8C7-CBA7-D650-2CC39B9C72D8}"/>
               </a:ext>
             </a:extLst>
           </p:cNvPr>
@@ -3955,15 +4358,15 @@
         </p:blipFill>
         <p:spPr>
           <a:xfrm>
-            <a:off x="0" y="0"/>
-            <a:ext cx="12192000" cy="6858000"/>
+            <a:off x="0" y="-404734"/>
+            <a:ext cx="12192000" cy="7217015"/>
           </a:xfrm>
         </p:spPr>
       </p:pic>
     </p:spTree>
     <p:extLst>
       <p:ext uri="{BB962C8B-B14F-4D97-AF65-F5344CB8AC3E}">
-        <p14:creationId xmlns:p14="http://schemas.microsoft.com/office/powerpoint/2010/main" val="3446693626"/>
+        <p14:creationId xmlns:p14="http://schemas.microsoft.com/office/powerpoint/2010/main" val="3073409952"/>
       </p:ext>
     </p:extLst>
   </p:cSld>
@@ -4003,7 +4406,7 @@
           <p:cNvPr id="2" name="Title 1">
             <a:extLst>
               <a:ext uri="{FF2B5EF4-FFF2-40B4-BE49-F238E27FC236}">
-                <a16:creationId xmlns:a16="http://schemas.microsoft.com/office/drawing/2014/main" id="{657790E6-62C1-D302-8CF4-574ABEC2CBFB}"/>
+                <a16:creationId xmlns:a16="http://schemas.microsoft.com/office/drawing/2014/main" id="{AA2C6B31-03FE-3C20-C2CB-EBC0EE5C9BDB}"/>
               </a:ext>
             </a:extLst>
           </p:cNvPr>
@@ -4016,12 +4419,14 @@
         </p:nvSpPr>
         <p:spPr>
           <a:xfrm>
-            <a:off x="838200" y="104932"/>
-            <a:ext cx="10515600" cy="929390"/>
+            <a:off x="838200" y="104931"/>
+            <a:ext cx="10515600" cy="734517"/>
           </a:xfrm>
         </p:spPr>
         <p:txBody>
-          <a:bodyPr/>
+          <a:bodyPr>
+            <a:normAutofit/>
+          </a:bodyPr>
           <a:lstStyle/>
           <a:p>
             <a:endParaRPr lang="en-US" dirty="0"/>
@@ -4030,10 +4435,10 @@
       </p:sp>
       <p:pic>
         <p:nvPicPr>
-          <p:cNvPr id="5" name="Content Placeholder 4" descr="A diagram of data security process&#10;&#10;AI-generated content may be incorrect.">
-            <a:extLst>
-              <a:ext uri="{FF2B5EF4-FFF2-40B4-BE49-F238E27FC236}">
-                <a16:creationId xmlns:a16="http://schemas.microsoft.com/office/drawing/2014/main" id="{4A0F6C25-3A01-4693-FCDF-4C7ACFCF013D}"/>
+          <p:cNvPr id="5" name="Content Placeholder 4" descr="A diagram of a diagram&#10;&#10;AI-generated content may be incorrect.">
+            <a:extLst>
+              <a:ext uri="{FF2B5EF4-FFF2-40B4-BE49-F238E27FC236}">
+                <a16:creationId xmlns:a16="http://schemas.microsoft.com/office/drawing/2014/main" id="{E3F4AFEA-4E5E-C5D3-DE59-0B831E4EFC6E}"/>
               </a:ext>
             </a:extLst>
           </p:cNvPr>
@@ -4058,15 +4463,15 @@
         </p:blipFill>
         <p:spPr>
           <a:xfrm>
-            <a:off x="0" y="-134910"/>
-            <a:ext cx="12192000" cy="6887978"/>
+            <a:off x="0" y="0"/>
+            <a:ext cx="12192000" cy="6858000"/>
           </a:xfrm>
         </p:spPr>
       </p:pic>
     </p:spTree>
     <p:extLst>
       <p:ext uri="{BB962C8B-B14F-4D97-AF65-F5344CB8AC3E}">
-        <p14:creationId xmlns:p14="http://schemas.microsoft.com/office/powerpoint/2010/main" val="147147358"/>
+        <p14:creationId xmlns:p14="http://schemas.microsoft.com/office/powerpoint/2010/main" val="3446693626"/>
       </p:ext>
     </p:extLst>
   </p:cSld>
@@ -4106,7 +4511,7 @@
           <p:cNvPr id="2" name="Title 1">
             <a:extLst>
               <a:ext uri="{FF2B5EF4-FFF2-40B4-BE49-F238E27FC236}">
-                <a16:creationId xmlns:a16="http://schemas.microsoft.com/office/drawing/2014/main" id="{9A2A15BB-1797-9797-D392-D404DC719B63}"/>
+                <a16:creationId xmlns:a16="http://schemas.microsoft.com/office/drawing/2014/main" id="{657790E6-62C1-D302-8CF4-574ABEC2CBFB}"/>
               </a:ext>
             </a:extLst>
           </p:cNvPr>
@@ -4117,21 +4522,26 @@
             <p:ph type="title"/>
           </p:nvPr>
         </p:nvSpPr>
-        <p:spPr/>
-        <p:txBody>
-          <a:bodyPr/>
-          <a:lstStyle/>
-          <a:p>
-            <a:endParaRPr lang="en-US"/>
+        <p:spPr>
+          <a:xfrm>
+            <a:off x="838200" y="104932"/>
+            <a:ext cx="10515600" cy="929390"/>
+          </a:xfrm>
+        </p:spPr>
+        <p:txBody>
+          <a:bodyPr/>
+          <a:lstStyle/>
+          <a:p>
+            <a:endParaRPr lang="en-US" dirty="0"/>
           </a:p>
         </p:txBody>
       </p:sp>
       <p:pic>
         <p:nvPicPr>
-          <p:cNvPr id="5" name="Content Placeholder 4" descr="A screenshot of a computer&#10;&#10;AI-generated content may be incorrect.">
-            <a:extLst>
-              <a:ext uri="{FF2B5EF4-FFF2-40B4-BE49-F238E27FC236}">
-                <a16:creationId xmlns:a16="http://schemas.microsoft.com/office/drawing/2014/main" id="{41B955B6-A085-0C88-B7E3-465EB50D1E82}"/>
+          <p:cNvPr id="5" name="Content Placeholder 4" descr="A diagram of data security process&#10;&#10;AI-generated content may be incorrect.">
+            <a:extLst>
+              <a:ext uri="{FF2B5EF4-FFF2-40B4-BE49-F238E27FC236}">
+                <a16:creationId xmlns:a16="http://schemas.microsoft.com/office/drawing/2014/main" id="{4A0F6C25-3A01-4693-FCDF-4C7ACFCF013D}"/>
               </a:ext>
             </a:extLst>
           </p:cNvPr>
@@ -4156,15 +4566,15 @@
         </p:blipFill>
         <p:spPr>
           <a:xfrm>
-            <a:off x="0" y="-239843"/>
-            <a:ext cx="12192000" cy="7097843"/>
+            <a:off x="0" y="-134910"/>
+            <a:ext cx="12192000" cy="6887978"/>
           </a:xfrm>
         </p:spPr>
       </p:pic>
     </p:spTree>
     <p:extLst>
       <p:ext uri="{BB962C8B-B14F-4D97-AF65-F5344CB8AC3E}">
-        <p14:creationId xmlns:p14="http://schemas.microsoft.com/office/powerpoint/2010/main" val="806338919"/>
+        <p14:creationId xmlns:p14="http://schemas.microsoft.com/office/powerpoint/2010/main" val="147147358"/>
       </p:ext>
     </p:extLst>
   </p:cSld>
@@ -4204,6 +4614,104 @@
           <p:cNvPr id="2" name="Title 1">
             <a:extLst>
               <a:ext uri="{FF2B5EF4-FFF2-40B4-BE49-F238E27FC236}">
+                <a16:creationId xmlns:a16="http://schemas.microsoft.com/office/drawing/2014/main" id="{9A2A15BB-1797-9797-D392-D404DC719B63}"/>
+              </a:ext>
+            </a:extLst>
+          </p:cNvPr>
+          <p:cNvSpPr>
+            <a:spLocks noGrp="1"/>
+          </p:cNvSpPr>
+          <p:nvPr>
+            <p:ph type="title"/>
+          </p:nvPr>
+        </p:nvSpPr>
+        <p:spPr/>
+        <p:txBody>
+          <a:bodyPr/>
+          <a:lstStyle/>
+          <a:p>
+            <a:endParaRPr lang="en-US"/>
+          </a:p>
+        </p:txBody>
+      </p:sp>
+      <p:pic>
+        <p:nvPicPr>
+          <p:cNvPr id="5" name="Content Placeholder 4" descr="A screenshot of a computer&#10;&#10;AI-generated content may be incorrect.">
+            <a:extLst>
+              <a:ext uri="{FF2B5EF4-FFF2-40B4-BE49-F238E27FC236}">
+                <a16:creationId xmlns:a16="http://schemas.microsoft.com/office/drawing/2014/main" id="{41B955B6-A085-0C88-B7E3-465EB50D1E82}"/>
+              </a:ext>
+            </a:extLst>
+          </p:cNvPr>
+          <p:cNvPicPr>
+            <a:picLocks noGrp="1" noChangeAspect="1"/>
+          </p:cNvPicPr>
+          <p:nvPr>
+            <p:ph idx="1"/>
+          </p:nvPr>
+        </p:nvPicPr>
+        <p:blipFill>
+          <a:blip r:embed="rId2">
+            <a:extLst>
+              <a:ext uri="{28A0092B-C50C-407E-A947-70E740481C1C}">
+                <a14:useLocalDpi xmlns:a14="http://schemas.microsoft.com/office/drawing/2010/main" val="0"/>
+              </a:ext>
+            </a:extLst>
+          </a:blip>
+          <a:stretch>
+            <a:fillRect/>
+          </a:stretch>
+        </p:blipFill>
+        <p:spPr>
+          <a:xfrm>
+            <a:off x="0" y="-239843"/>
+            <a:ext cx="12192000" cy="7097843"/>
+          </a:xfrm>
+        </p:spPr>
+      </p:pic>
+    </p:spTree>
+    <p:extLst>
+      <p:ext uri="{BB962C8B-B14F-4D97-AF65-F5344CB8AC3E}">
+        <p14:creationId xmlns:p14="http://schemas.microsoft.com/office/powerpoint/2010/main" val="806338919"/>
+      </p:ext>
+    </p:extLst>
+  </p:cSld>
+  <p:clrMapOvr>
+    <a:masterClrMapping/>
+  </p:clrMapOvr>
+</p:sld>
+</file>
+
+<file path=ppt/slides/slide9.xml><?xml version="1.0" encoding="utf-8"?>
+<p:sld xmlns:a="http://schemas.openxmlformats.org/drawingml/2006/main" xmlns:r="http://schemas.openxmlformats.org/officeDocument/2006/relationships" xmlns:p="http://schemas.openxmlformats.org/presentationml/2006/main">
+  <p:cSld>
+    <p:bg>
+      <p:bgPr>
+        <a:solidFill>
+          <a:schemeClr val="tx1"/>
+        </a:solidFill>
+        <a:effectLst/>
+      </p:bgPr>
+    </p:bg>
+    <p:spTree>
+      <p:nvGrpSpPr>
+        <p:cNvPr id="1" name=""/>
+        <p:cNvGrpSpPr/>
+        <p:nvPr/>
+      </p:nvGrpSpPr>
+      <p:grpSpPr>
+        <a:xfrm>
+          <a:off x="0" y="0"/>
+          <a:ext cx="0" cy="0"/>
+          <a:chOff x="0" y="0"/>
+          <a:chExt cx="0" cy="0"/>
+        </a:xfrm>
+      </p:grpSpPr>
+      <p:sp>
+        <p:nvSpPr>
+          <p:cNvPr id="2" name="Title 1">
+            <a:extLst>
+              <a:ext uri="{FF2B5EF4-FFF2-40B4-BE49-F238E27FC236}">
                 <a16:creationId xmlns:a16="http://schemas.microsoft.com/office/drawing/2014/main" id="{77272FE5-DED5-0259-B23E-EC66F7E03C13}"/>
               </a:ext>
             </a:extLst>
@@ -4263,96 +4771,6 @@
     <p:extLst>
       <p:ext uri="{BB962C8B-B14F-4D97-AF65-F5344CB8AC3E}">
         <p14:creationId xmlns:p14="http://schemas.microsoft.com/office/powerpoint/2010/main" val="2051539181"/>
-      </p:ext>
-    </p:extLst>
-  </p:cSld>
-  <p:clrMapOvr>
-    <a:masterClrMapping/>
-  </p:clrMapOvr>
-</p:sld>
-</file>
-
-<file path=ppt/slides/slide9.xml><?xml version="1.0" encoding="utf-8"?>
-<p:sld xmlns:a="http://schemas.openxmlformats.org/drawingml/2006/main" xmlns:r="http://schemas.openxmlformats.org/officeDocument/2006/relationships" xmlns:p="http://schemas.openxmlformats.org/presentationml/2006/main">
-  <p:cSld>
-    <p:spTree>
-      <p:nvGrpSpPr>
-        <p:cNvPr id="1" name=""/>
-        <p:cNvGrpSpPr/>
-        <p:nvPr/>
-      </p:nvGrpSpPr>
-      <p:grpSpPr>
-        <a:xfrm>
-          <a:off x="0" y="0"/>
-          <a:ext cx="0" cy="0"/>
-          <a:chOff x="0" y="0"/>
-          <a:chExt cx="0" cy="0"/>
-        </a:xfrm>
-      </p:grpSpPr>
-      <p:sp>
-        <p:nvSpPr>
-          <p:cNvPr id="2" name="Title 1">
-            <a:extLst>
-              <a:ext uri="{FF2B5EF4-FFF2-40B4-BE49-F238E27FC236}">
-                <a16:creationId xmlns:a16="http://schemas.microsoft.com/office/drawing/2014/main" id="{C7929935-7FC9-CEA3-806F-9AF5B32D42B2}"/>
-              </a:ext>
-            </a:extLst>
-          </p:cNvPr>
-          <p:cNvSpPr>
-            <a:spLocks noGrp="1"/>
-          </p:cNvSpPr>
-          <p:nvPr>
-            <p:ph type="title"/>
-          </p:nvPr>
-        </p:nvSpPr>
-        <p:spPr/>
-        <p:txBody>
-          <a:bodyPr/>
-          <a:lstStyle/>
-          <a:p>
-            <a:endParaRPr lang="en-US"/>
-          </a:p>
-        </p:txBody>
-      </p:sp>
-      <p:pic>
-        <p:nvPicPr>
-          <p:cNvPr id="5" name="Content Placeholder 4" descr="A screenshot of a computer&#10;&#10;AI-generated content may be incorrect.">
-            <a:extLst>
-              <a:ext uri="{FF2B5EF4-FFF2-40B4-BE49-F238E27FC236}">
-                <a16:creationId xmlns:a16="http://schemas.microsoft.com/office/drawing/2014/main" id="{47C287C9-C4A1-58C9-5670-C39AF0CECB03}"/>
-              </a:ext>
-            </a:extLst>
-          </p:cNvPr>
-          <p:cNvPicPr>
-            <a:picLocks noGrp="1" noChangeAspect="1"/>
-          </p:cNvPicPr>
-          <p:nvPr>
-            <p:ph idx="1"/>
-          </p:nvPr>
-        </p:nvPicPr>
-        <p:blipFill>
-          <a:blip r:embed="rId2">
-            <a:extLst>
-              <a:ext uri="{28A0092B-C50C-407E-A947-70E740481C1C}">
-                <a14:useLocalDpi xmlns:a14="http://schemas.microsoft.com/office/drawing/2010/main" val="0"/>
-              </a:ext>
-            </a:extLst>
-          </a:blip>
-          <a:stretch>
-            <a:fillRect/>
-          </a:stretch>
-        </p:blipFill>
-        <p:spPr>
-          <a:xfrm>
-            <a:off x="0" y="0"/>
-            <a:ext cx="12192000" cy="6858000"/>
-          </a:xfrm>
-        </p:spPr>
-      </p:pic>
-    </p:spTree>
-    <p:extLst>
-      <p:ext uri="{BB962C8B-B14F-4D97-AF65-F5344CB8AC3E}">
-        <p14:creationId xmlns:p14="http://schemas.microsoft.com/office/powerpoint/2010/main" val="3843908412"/>
       </p:ext>
     </p:extLst>
   </p:cSld>

</xml_diff>